<commit_message>
Demo improvements (removed Lenin's picture by a Solution Explorer screenshot).
</commit_message>
<xml_diff>
--- a/week07/day04/demo/ppt-w07.pptx
+++ b/week07/day04/demo/ppt-w07.pptx
@@ -5,7 +5,7 @@
     <p:sldMasterId id="2147483684" r:id="rId1"/>
   </p:sldMasterIdLst>
   <p:notesMasterIdLst>
-    <p:notesMasterId r:id="rId8"/>
+    <p:notesMasterId r:id="rId11"/>
   </p:notesMasterIdLst>
   <p:sldIdLst>
     <p:sldId id="256" r:id="rId2"/>
@@ -14,6 +14,9 @@
     <p:sldId id="259" r:id="rId5"/>
     <p:sldId id="260" r:id="rId6"/>
     <p:sldId id="261" r:id="rId7"/>
+    <p:sldId id="263" r:id="rId8"/>
+    <p:sldId id="264" r:id="rId9"/>
+    <p:sldId id="265" r:id="rId10"/>
   </p:sldIdLst>
   <p:sldSz cx="9144000" cy="6858000" type="screen4x3"/>
   <p:notesSz cx="6858000" cy="9144000"/>
@@ -4389,7 +4392,7 @@
                 <a:latin typeface="Helvetica" panose="020B0604020202020204" pitchFamily="34" charset="0"/>
                 <a:cs typeface="Helvetica" panose="020B0604020202020204" pitchFamily="34" charset="0"/>
               </a:rPr>
-              <a:t>TDD Poker</a:t>
+              <a:t>Poker</a:t>
             </a:r>
             <a:endParaRPr lang="en-GB" dirty="0">
               <a:latin typeface="Helvetica" panose="020B0604020202020204" pitchFamily="34" charset="0"/>
@@ -4435,7 +4438,7 @@
                 <a:latin typeface="Helvetica" panose="020B0604020202020204" pitchFamily="34" charset="0"/>
                 <a:cs typeface="Helvetica" panose="020B0604020202020204" pitchFamily="34" charset="0"/>
               </a:rPr>
-              <a:t>Status checks are made by unit tests, </a:t>
+              <a:t>Status checks are made by unit tests, which represent different hand combinations and comparisons of them</a:t>
             </a:r>
           </a:p>
         </p:txBody>
@@ -4581,7 +4584,7 @@
                 <a:latin typeface="Helvetica" panose="020B0604020202020204" pitchFamily="34" charset="0"/>
                 <a:cs typeface="Helvetica" panose="020B0604020202020204" pitchFamily="34" charset="0"/>
               </a:rPr>
-              <a:t>TDD Poker</a:t>
+              <a:t>Program structure</a:t>
             </a:r>
             <a:endParaRPr lang="en-GB" dirty="0">
               <a:latin typeface="Helvetica" panose="020B0604020202020204" pitchFamily="34" charset="0"/>
@@ -4609,12 +4612,12 @@
         <p:spPr>
           <a:xfrm>
             <a:off x="822959" y="1845734"/>
-            <a:ext cx="3735789" cy="4023360"/>
+            <a:ext cx="4120102" cy="4023360"/>
           </a:xfrm>
         </p:spPr>
         <p:txBody>
           <a:bodyPr>
-            <a:normAutofit fontScale="85000" lnSpcReduction="20000"/>
+            <a:normAutofit fontScale="92500" lnSpcReduction="10000"/>
           </a:bodyPr>
           <a:lstStyle/>
           <a:p>
@@ -4623,7 +4626,7 @@
                 <a:latin typeface="Helvetica" panose="020B0604020202020204" pitchFamily="34" charset="0"/>
                 <a:cs typeface="Helvetica" panose="020B0604020202020204" pitchFamily="34" charset="0"/>
               </a:rPr>
-              <a:t>Hand class (not represents the exact hands, but handles them</a:t>
+              <a:t>A Hand class (not represents the exact hands, but handles them): it sorts the cards and mark them if they are parts of a combination</a:t>
             </a:r>
           </a:p>
           <a:p>
@@ -4632,16 +4635,21 @@
                 <a:latin typeface="Helvetica" panose="020B0604020202020204" pitchFamily="34" charset="0"/>
                 <a:cs typeface="Helvetica" panose="020B0604020202020204" pitchFamily="34" charset="0"/>
               </a:rPr>
-              <a:t>It sorts the cards and mark them if they are parts of a combination</a:t>
-            </a:r>
-          </a:p>
-          <a:p>
+              <a:t>Another Test file (</a:t>
+            </a:r>
+            <a:r>
+              <a:rPr lang="hu-HU" sz="3200">
+                <a:latin typeface="Helvetica" panose="020B0604020202020204" pitchFamily="34" charset="0"/>
+                <a:cs typeface="Helvetica" panose="020B0604020202020204" pitchFamily="34" charset="0"/>
+              </a:rPr>
+              <a:t>other project) </a:t>
+            </a:r>
             <a:r>
               <a:rPr lang="hu-HU" sz="3200" dirty="0">
                 <a:latin typeface="Helvetica" panose="020B0604020202020204" pitchFamily="34" charset="0"/>
                 <a:cs typeface="Helvetica" panose="020B0604020202020204" pitchFamily="34" charset="0"/>
               </a:rPr>
-              <a:t>The Game method calls others and returns with an int, depended on the comparison status</a:t>
+              <a:t>is responsible for unit tests</a:t>
             </a:r>
           </a:p>
         </p:txBody>
@@ -4733,10 +4741,10 @@
       </p:sp>
       <p:pic>
         <p:nvPicPr>
-          <p:cNvPr id="8" name="Kép 7">
+          <p:cNvPr id="10" name="Kép 9">
             <a:extLst>
               <a:ext uri="{FF2B5EF4-FFF2-40B4-BE49-F238E27FC236}">
-                <a16:creationId xmlns:a16="http://schemas.microsoft.com/office/drawing/2014/main" id="{D982C32F-3C37-4DA7-B5A9-29660DA1325C}"/>
+                <a16:creationId xmlns:a16="http://schemas.microsoft.com/office/drawing/2014/main" id="{E0F512BA-E7E5-44B4-9522-1BF7CE9DD754}"/>
               </a:ext>
             </a:extLst>
           </p:cNvPr>
@@ -4746,21 +4754,15 @@
           <p:nvPr/>
         </p:nvPicPr>
         <p:blipFill>
-          <a:blip r:embed="rId2">
-            <a:extLst>
-              <a:ext uri="{28A0092B-C50C-407E-A947-70E740481C1C}">
-                <a14:useLocalDpi xmlns:a14="http://schemas.microsoft.com/office/drawing/2010/main" val="0"/>
-              </a:ext>
-            </a:extLst>
-          </a:blip>
+          <a:blip r:embed="rId2"/>
           <a:stretch>
             <a:fillRect/>
           </a:stretch>
         </p:blipFill>
         <p:spPr>
           <a:xfrm>
-            <a:off x="5234609" y="1886090"/>
-            <a:ext cx="3174754" cy="4355608"/>
+            <a:off x="5408043" y="1845734"/>
+            <a:ext cx="2958717" cy="4023360"/>
           </a:xfrm>
           <a:prstGeom prst="rect">
             <a:avLst/>
@@ -4823,7 +4825,7 @@
                 <a:latin typeface="Helvetica" panose="020B0604020202020204" pitchFamily="34" charset="0"/>
                 <a:cs typeface="Helvetica" panose="020B0604020202020204" pitchFamily="34" charset="0"/>
               </a:rPr>
-              <a:t>TDD Poker methods</a:t>
+              <a:t>Poker methods</a:t>
             </a:r>
             <a:endParaRPr lang="en-GB" dirty="0">
               <a:latin typeface="Helvetica" panose="020B0604020202020204" pitchFamily="34" charset="0"/>
@@ -4851,7 +4853,7 @@
         <p:spPr/>
         <p:txBody>
           <a:bodyPr>
-            <a:normAutofit lnSpcReduction="10000"/>
+            <a:normAutofit fontScale="92500" lnSpcReduction="10000"/>
           </a:bodyPr>
           <a:lstStyle/>
           <a:p>
@@ -4869,21 +4871,7 @@
                 <a:latin typeface="Helvetica" panose="020B0604020202020204" pitchFamily="34" charset="0"/>
                 <a:cs typeface="Helvetica" panose="020B0604020202020204" pitchFamily="34" charset="0"/>
               </a:rPr>
-              <a:t>Combination – gives the hand a combination value (also using SortElements) and marks the </a:t>
-            </a:r>
-            <a:r>
-              <a:rPr lang="hu-HU" sz="3200">
-                <a:latin typeface="Helvetica" panose="020B0604020202020204" pitchFamily="34" charset="0"/>
-                <a:cs typeface="Helvetica" panose="020B0604020202020204" pitchFamily="34" charset="0"/>
-              </a:rPr>
-              <a:t>ones in </a:t>
-            </a:r>
-            <a:r>
-              <a:rPr lang="hu-HU" sz="3200" dirty="0">
-                <a:latin typeface="Helvetica" panose="020B0604020202020204" pitchFamily="34" charset="0"/>
-                <a:cs typeface="Helvetica" panose="020B0604020202020204" pitchFamily="34" charset="0"/>
-              </a:rPr>
-              <a:t>the combination</a:t>
+              <a:t>Combination – gives the hand a combination value (also using SortElements) and marks the ones in the combination</a:t>
             </a:r>
           </a:p>
           <a:p>
@@ -4901,7 +4889,7 @@
                 <a:latin typeface="Helvetica" panose="020B0604020202020204" pitchFamily="34" charset="0"/>
                 <a:cs typeface="Helvetica" panose="020B0604020202020204" pitchFamily="34" charset="0"/>
               </a:rPr>
-              <a:t>Game – uses all others</a:t>
+              <a:t>Game – uses all others, returns which player won</a:t>
             </a:r>
           </a:p>
         </p:txBody>
@@ -5042,6 +5030,13 @@
           <a:bodyPr/>
           <a:lstStyle/>
           <a:p>
+            <a:r>
+              <a:rPr lang="hu-HU" dirty="0">
+                <a:latin typeface="Helvetica" panose="020B0604020202020204" pitchFamily="34" charset="0"/>
+                <a:cs typeface="Helvetica" panose="020B0604020202020204" pitchFamily="34" charset="0"/>
+              </a:rPr>
+              <a:t>SortElements</a:t>
+            </a:r>
             <a:endParaRPr lang="en-GB" dirty="0">
               <a:latin typeface="Helvetica" panose="020B0604020202020204" pitchFamily="34" charset="0"/>
               <a:cs typeface="Helvetica" panose="020B0604020202020204" pitchFamily="34" charset="0"/>
@@ -5049,36 +5044,38 @@
           </a:p>
         </p:txBody>
       </p:sp>
-      <p:sp>
-        <p:nvSpPr>
-          <p:cNvPr id="3" name="Tartalom helye 2">
+      <p:pic>
+        <p:nvPicPr>
+          <p:cNvPr id="7" name="Tartalom helye 6">
             <a:extLst>
               <a:ext uri="{FF2B5EF4-FFF2-40B4-BE49-F238E27FC236}">
-                <a16:creationId xmlns:a16="http://schemas.microsoft.com/office/drawing/2014/main" id="{4F088FF8-C589-487E-92A7-593551C60CA6}"/>
+                <a16:creationId xmlns:a16="http://schemas.microsoft.com/office/drawing/2014/main" id="{D8D7C18B-7CD4-4294-A600-EA7A76E59DC3}"/>
               </a:ext>
             </a:extLst>
           </p:cNvPr>
-          <p:cNvSpPr>
-            <a:spLocks noGrp="1"/>
-          </p:cNvSpPr>
+          <p:cNvPicPr>
+            <a:picLocks noGrp="1" noChangeAspect="1"/>
+          </p:cNvPicPr>
           <p:nvPr>
             <p:ph idx="1"/>
           </p:nvPr>
-        </p:nvSpPr>
-        <p:spPr/>
-        <p:txBody>
-          <a:bodyPr>
-            <a:normAutofit/>
-          </a:bodyPr>
-          <a:lstStyle/>
-          <a:p>
-            <a:endParaRPr lang="en-GB" sz="3200" dirty="0">
-              <a:latin typeface="Helvetica" panose="020B0604020202020204" pitchFamily="34" charset="0"/>
-              <a:cs typeface="Helvetica" panose="020B0604020202020204" pitchFamily="34" charset="0"/>
-            </a:endParaRPr>
-          </a:p>
-        </p:txBody>
-      </p:sp>
+        </p:nvPicPr>
+        <p:blipFill>
+          <a:blip r:embed="rId2"/>
+          <a:stretch>
+            <a:fillRect/>
+          </a:stretch>
+        </p:blipFill>
+        <p:spPr>
+          <a:xfrm>
+            <a:off x="1950567" y="2000866"/>
+            <a:ext cx="5288586" cy="4195414"/>
+          </a:xfrm>
+          <a:prstGeom prst="rect">
+            <a:avLst/>
+          </a:prstGeom>
+        </p:spPr>
+      </p:pic>
       <p:sp>
         <p:nvSpPr>
           <p:cNvPr id="4" name="Dátum helye 3">
@@ -5215,6 +5212,13 @@
           <a:bodyPr/>
           <a:lstStyle/>
           <a:p>
+            <a:r>
+              <a:rPr lang="hu-HU" dirty="0">
+                <a:latin typeface="Helvetica" panose="020B0604020202020204" pitchFamily="34" charset="0"/>
+                <a:cs typeface="Helvetica" panose="020B0604020202020204" pitchFamily="34" charset="0"/>
+              </a:rPr>
+              <a:t>Combination</a:t>
+            </a:r>
             <a:endParaRPr lang="en-GB" dirty="0">
               <a:latin typeface="Helvetica" panose="020B0604020202020204" pitchFamily="34" charset="0"/>
               <a:cs typeface="Helvetica" panose="020B0604020202020204" pitchFamily="34" charset="0"/>
@@ -5238,13 +5242,34 @@
             <p:ph idx="1"/>
           </p:nvPr>
         </p:nvSpPr>
-        <p:spPr/>
+        <p:spPr>
+          <a:xfrm>
+            <a:off x="822959" y="1845734"/>
+            <a:ext cx="3152693" cy="4023360"/>
+          </a:xfrm>
+        </p:spPr>
         <p:txBody>
           <a:bodyPr>
-            <a:normAutofit/>
+            <a:normAutofit fontScale="85000" lnSpcReduction="10000"/>
           </a:bodyPr>
           <a:lstStyle/>
           <a:p>
+            <a:r>
+              <a:rPr lang="hu-HU" sz="3200" dirty="0">
+                <a:latin typeface="Helvetica" panose="020B0604020202020204" pitchFamily="34" charset="0"/>
+                <a:cs typeface="Helvetica" panose="020B0604020202020204" pitchFamily="34" charset="0"/>
+              </a:rPr>
+              <a:t>Gives a new element to the list (combination value)</a:t>
+            </a:r>
+          </a:p>
+          <a:p>
+            <a:r>
+              <a:rPr lang="hu-HU" sz="3200" dirty="0">
+                <a:latin typeface="Helvetica" panose="020B0604020202020204" pitchFamily="34" charset="0"/>
+                <a:cs typeface="Helvetica" panose="020B0604020202020204" pitchFamily="34" charset="0"/>
+              </a:rPr>
+              <a:t>It gets a value by counting the corresponding card values (with modifications to fit to the official combination order)</a:t>
+            </a:r>
             <a:endParaRPr lang="en-GB" sz="3200" dirty="0">
               <a:latin typeface="Helvetica" panose="020B0604020202020204" pitchFamily="34" charset="0"/>
               <a:cs typeface="Helvetica" panose="020B0604020202020204" pitchFamily="34" charset="0"/>
@@ -5337,10 +5362,638 @@
           </a:p>
         </p:txBody>
       </p:sp>
+      <p:pic>
+        <p:nvPicPr>
+          <p:cNvPr id="8" name="Kép 7">
+            <a:extLst>
+              <a:ext uri="{FF2B5EF4-FFF2-40B4-BE49-F238E27FC236}">
+                <a16:creationId xmlns:a16="http://schemas.microsoft.com/office/drawing/2014/main" id="{167FF3A2-5625-4841-961B-871DD3DD73BD}"/>
+              </a:ext>
+            </a:extLst>
+          </p:cNvPr>
+          <p:cNvPicPr>
+            <a:picLocks noChangeAspect="1"/>
+          </p:cNvPicPr>
+          <p:nvPr/>
+        </p:nvPicPr>
+        <p:blipFill>
+          <a:blip r:embed="rId2"/>
+          <a:stretch>
+            <a:fillRect/>
+          </a:stretch>
+        </p:blipFill>
+        <p:spPr>
+          <a:xfrm>
+            <a:off x="4084583" y="1833772"/>
+            <a:ext cx="4324779" cy="4447758"/>
+          </a:xfrm>
+          <a:prstGeom prst="rect">
+            <a:avLst/>
+          </a:prstGeom>
+        </p:spPr>
+      </p:pic>
     </p:spTree>
     <p:extLst>
       <p:ext uri="{BB962C8B-B14F-4D97-AF65-F5344CB8AC3E}">
         <p14:creationId xmlns:p14="http://schemas.microsoft.com/office/powerpoint/2010/main" val="273143224"/>
+      </p:ext>
+    </p:extLst>
+  </p:cSld>
+  <p:clrMapOvr>
+    <a:masterClrMapping/>
+  </p:clrMapOvr>
+</p:sld>
+</file>
+
+<file path=ppt/slides/slide7.xml><?xml version="1.0" encoding="utf-8"?>
+<p:sld xmlns:a="http://schemas.openxmlformats.org/drawingml/2006/main" xmlns:r="http://schemas.openxmlformats.org/officeDocument/2006/relationships" xmlns:p="http://schemas.openxmlformats.org/presentationml/2006/main">
+  <p:cSld>
+    <p:spTree>
+      <p:nvGrpSpPr>
+        <p:cNvPr id="1" name=""/>
+        <p:cNvGrpSpPr/>
+        <p:nvPr/>
+      </p:nvGrpSpPr>
+      <p:grpSpPr>
+        <a:xfrm>
+          <a:off x="0" y="0"/>
+          <a:ext cx="0" cy="0"/>
+          <a:chOff x="0" y="0"/>
+          <a:chExt cx="0" cy="0"/>
+        </a:xfrm>
+      </p:grpSpPr>
+      <p:sp>
+        <p:nvSpPr>
+          <p:cNvPr id="2" name="Cím 1">
+            <a:extLst>
+              <a:ext uri="{FF2B5EF4-FFF2-40B4-BE49-F238E27FC236}">
+                <a16:creationId xmlns:a16="http://schemas.microsoft.com/office/drawing/2014/main" id="{CD61F941-FFC1-44DC-961F-AC96DB63EA04}"/>
+              </a:ext>
+            </a:extLst>
+          </p:cNvPr>
+          <p:cNvSpPr>
+            <a:spLocks noGrp="1"/>
+          </p:cNvSpPr>
+          <p:nvPr>
+            <p:ph type="title"/>
+          </p:nvPr>
+        </p:nvSpPr>
+        <p:spPr/>
+        <p:txBody>
+          <a:bodyPr/>
+          <a:lstStyle/>
+          <a:p>
+            <a:r>
+              <a:rPr lang="hu-HU" dirty="0">
+                <a:latin typeface="Helvetica" panose="020B0604020202020204" pitchFamily="34" charset="0"/>
+                <a:cs typeface="Helvetica" panose="020B0604020202020204" pitchFamily="34" charset="0"/>
+              </a:rPr>
+              <a:t>RemoveElement</a:t>
+            </a:r>
+            <a:endParaRPr lang="en-GB" dirty="0">
+              <a:latin typeface="Helvetica" panose="020B0604020202020204" pitchFamily="34" charset="0"/>
+              <a:cs typeface="Helvetica" panose="020B0604020202020204" pitchFamily="34" charset="0"/>
+            </a:endParaRPr>
+          </a:p>
+        </p:txBody>
+      </p:sp>
+      <p:sp>
+        <p:nvSpPr>
+          <p:cNvPr id="3" name="Tartalom helye 2">
+            <a:extLst>
+              <a:ext uri="{FF2B5EF4-FFF2-40B4-BE49-F238E27FC236}">
+                <a16:creationId xmlns:a16="http://schemas.microsoft.com/office/drawing/2014/main" id="{4F088FF8-C589-487E-92A7-593551C60CA6}"/>
+              </a:ext>
+            </a:extLst>
+          </p:cNvPr>
+          <p:cNvSpPr>
+            <a:spLocks noGrp="1"/>
+          </p:cNvSpPr>
+          <p:nvPr>
+            <p:ph idx="1"/>
+          </p:nvPr>
+        </p:nvSpPr>
+        <p:spPr>
+          <a:xfrm>
+            <a:off x="822960" y="1845734"/>
+            <a:ext cx="2821388" cy="4237014"/>
+          </a:xfrm>
+        </p:spPr>
+        <p:txBody>
+          <a:bodyPr>
+            <a:normAutofit/>
+          </a:bodyPr>
+          <a:lstStyle/>
+          <a:p>
+            <a:r>
+              <a:rPr lang="hu-HU" sz="3200" dirty="0">
+                <a:latin typeface="Helvetica" panose="020B0604020202020204" pitchFamily="34" charset="0"/>
+                <a:cs typeface="Helvetica" panose="020B0604020202020204" pitchFamily="34" charset="0"/>
+              </a:rPr>
+              <a:t>Removes the elements of the list which are not part of the combination (or are, depending on a parameter)</a:t>
+            </a:r>
+          </a:p>
+        </p:txBody>
+      </p:sp>
+      <p:sp>
+        <p:nvSpPr>
+          <p:cNvPr id="4" name="Dátum helye 3">
+            <a:extLst>
+              <a:ext uri="{FF2B5EF4-FFF2-40B4-BE49-F238E27FC236}">
+                <a16:creationId xmlns:a16="http://schemas.microsoft.com/office/drawing/2014/main" id="{EEA0F499-9B51-49B5-AB2B-A3D6BC3AC196}"/>
+              </a:ext>
+            </a:extLst>
+          </p:cNvPr>
+          <p:cNvSpPr>
+            <a:spLocks noGrp="1"/>
+          </p:cNvSpPr>
+          <p:nvPr>
+            <p:ph type="dt" sz="half" idx="10"/>
+          </p:nvPr>
+        </p:nvSpPr>
+        <p:spPr/>
+        <p:txBody>
+          <a:bodyPr/>
+          <a:lstStyle/>
+          <a:p>
+            <a:r>
+              <a:rPr lang="en-GB"/>
+              <a:t>27/10/2017</a:t>
+            </a:r>
+          </a:p>
+        </p:txBody>
+      </p:sp>
+      <p:sp>
+        <p:nvSpPr>
+          <p:cNvPr id="5" name="Élőláb helye 4">
+            <a:extLst>
+              <a:ext uri="{FF2B5EF4-FFF2-40B4-BE49-F238E27FC236}">
+                <a16:creationId xmlns:a16="http://schemas.microsoft.com/office/drawing/2014/main" id="{2F219574-FA9E-4B0B-BB27-630EE6176F27}"/>
+              </a:ext>
+            </a:extLst>
+          </p:cNvPr>
+          <p:cNvSpPr>
+            <a:spLocks noGrp="1"/>
+          </p:cNvSpPr>
+          <p:nvPr>
+            <p:ph type="ftr" sz="quarter" idx="11"/>
+          </p:nvPr>
+        </p:nvSpPr>
+        <p:spPr/>
+        <p:txBody>
+          <a:bodyPr/>
+          <a:lstStyle/>
+          <a:p>
+            <a:r>
+              <a:rPr lang="en-GB"/>
+              <a:t>Boldizsár Kiss</a:t>
+            </a:r>
+          </a:p>
+        </p:txBody>
+      </p:sp>
+      <p:sp>
+        <p:nvSpPr>
+          <p:cNvPr id="6" name="Dia számának helye 5">
+            <a:extLst>
+              <a:ext uri="{FF2B5EF4-FFF2-40B4-BE49-F238E27FC236}">
+                <a16:creationId xmlns:a16="http://schemas.microsoft.com/office/drawing/2014/main" id="{93557138-C83E-44C2-B277-AEF051AAF237}"/>
+              </a:ext>
+            </a:extLst>
+          </p:cNvPr>
+          <p:cNvSpPr>
+            <a:spLocks noGrp="1"/>
+          </p:cNvSpPr>
+          <p:nvPr>
+            <p:ph type="sldNum" sz="quarter" idx="12"/>
+          </p:nvPr>
+        </p:nvSpPr>
+        <p:spPr/>
+        <p:txBody>
+          <a:bodyPr/>
+          <a:lstStyle/>
+          <a:p>
+            <a:fld id="{A02811C3-B397-4C0C-B0F8-7534EDBE35B7}" type="slidenum">
+              <a:rPr lang="en-GB" smtClean="0"/>
+              <a:t>7</a:t>
+            </a:fld>
+            <a:endParaRPr lang="en-GB"/>
+          </a:p>
+        </p:txBody>
+      </p:sp>
+      <p:pic>
+        <p:nvPicPr>
+          <p:cNvPr id="7" name="Kép 6">
+            <a:extLst>
+              <a:ext uri="{FF2B5EF4-FFF2-40B4-BE49-F238E27FC236}">
+                <a16:creationId xmlns:a16="http://schemas.microsoft.com/office/drawing/2014/main" id="{F7B4C1ED-6AC0-4970-9EB5-A3A849E234AD}"/>
+              </a:ext>
+            </a:extLst>
+          </p:cNvPr>
+          <p:cNvPicPr>
+            <a:picLocks noChangeAspect="1"/>
+          </p:cNvPicPr>
+          <p:nvPr/>
+        </p:nvPicPr>
+        <p:blipFill>
+          <a:blip r:embed="rId2"/>
+          <a:stretch>
+            <a:fillRect/>
+          </a:stretch>
+        </p:blipFill>
+        <p:spPr>
+          <a:xfrm>
+            <a:off x="3700317" y="2267962"/>
+            <a:ext cx="4666443" cy="3392557"/>
+          </a:xfrm>
+          <a:prstGeom prst="rect">
+            <a:avLst/>
+          </a:prstGeom>
+        </p:spPr>
+      </p:pic>
+    </p:spTree>
+    <p:extLst>
+      <p:ext uri="{BB962C8B-B14F-4D97-AF65-F5344CB8AC3E}">
+        <p14:creationId xmlns:p14="http://schemas.microsoft.com/office/powerpoint/2010/main" val="1313336783"/>
+      </p:ext>
+    </p:extLst>
+  </p:cSld>
+  <p:clrMapOvr>
+    <a:masterClrMapping/>
+  </p:clrMapOvr>
+</p:sld>
+</file>
+
+<file path=ppt/slides/slide8.xml><?xml version="1.0" encoding="utf-8"?>
+<p:sld xmlns:a="http://schemas.openxmlformats.org/drawingml/2006/main" xmlns:r="http://schemas.openxmlformats.org/officeDocument/2006/relationships" xmlns:p="http://schemas.openxmlformats.org/presentationml/2006/main">
+  <p:cSld>
+    <p:spTree>
+      <p:nvGrpSpPr>
+        <p:cNvPr id="1" name=""/>
+        <p:cNvGrpSpPr/>
+        <p:nvPr/>
+      </p:nvGrpSpPr>
+      <p:grpSpPr>
+        <a:xfrm>
+          <a:off x="0" y="0"/>
+          <a:ext cx="0" cy="0"/>
+          <a:chOff x="0" y="0"/>
+          <a:chExt cx="0" cy="0"/>
+        </a:xfrm>
+      </p:grpSpPr>
+      <p:sp>
+        <p:nvSpPr>
+          <p:cNvPr id="2" name="Cím 1">
+            <a:extLst>
+              <a:ext uri="{FF2B5EF4-FFF2-40B4-BE49-F238E27FC236}">
+                <a16:creationId xmlns:a16="http://schemas.microsoft.com/office/drawing/2014/main" id="{CD61F941-FFC1-44DC-961F-AC96DB63EA04}"/>
+              </a:ext>
+            </a:extLst>
+          </p:cNvPr>
+          <p:cNvSpPr>
+            <a:spLocks noGrp="1"/>
+          </p:cNvSpPr>
+          <p:nvPr>
+            <p:ph type="title"/>
+          </p:nvPr>
+        </p:nvSpPr>
+        <p:spPr/>
+        <p:txBody>
+          <a:bodyPr/>
+          <a:lstStyle/>
+          <a:p>
+            <a:r>
+              <a:rPr lang="hu-HU" dirty="0">
+                <a:latin typeface="Helvetica" panose="020B0604020202020204" pitchFamily="34" charset="0"/>
+                <a:cs typeface="Helvetica" panose="020B0604020202020204" pitchFamily="34" charset="0"/>
+              </a:rPr>
+              <a:t>Tests</a:t>
+            </a:r>
+            <a:endParaRPr lang="en-GB" dirty="0">
+              <a:latin typeface="Helvetica" panose="020B0604020202020204" pitchFamily="34" charset="0"/>
+              <a:cs typeface="Helvetica" panose="020B0604020202020204" pitchFamily="34" charset="0"/>
+            </a:endParaRPr>
+          </a:p>
+        </p:txBody>
+      </p:sp>
+      <p:sp>
+        <p:nvSpPr>
+          <p:cNvPr id="3" name="Tartalom helye 2">
+            <a:extLst>
+              <a:ext uri="{FF2B5EF4-FFF2-40B4-BE49-F238E27FC236}">
+                <a16:creationId xmlns:a16="http://schemas.microsoft.com/office/drawing/2014/main" id="{4F088FF8-C589-487E-92A7-593551C60CA6}"/>
+              </a:ext>
+            </a:extLst>
+          </p:cNvPr>
+          <p:cNvSpPr>
+            <a:spLocks noGrp="1"/>
+          </p:cNvSpPr>
+          <p:nvPr>
+            <p:ph idx="1"/>
+          </p:nvPr>
+        </p:nvSpPr>
+        <p:spPr>
+          <a:xfrm>
+            <a:off x="822959" y="1845734"/>
+            <a:ext cx="3656275" cy="4023360"/>
+          </a:xfrm>
+        </p:spPr>
+        <p:txBody>
+          <a:bodyPr>
+            <a:normAutofit lnSpcReduction="10000"/>
+          </a:bodyPr>
+          <a:lstStyle/>
+          <a:p>
+            <a:r>
+              <a:rPr lang="hu-HU" sz="3200" dirty="0">
+                <a:latin typeface="Helvetica" panose="020B0604020202020204" pitchFamily="34" charset="0"/>
+                <a:cs typeface="Helvetica" panose="020B0604020202020204" pitchFamily="34" charset="0"/>
+              </a:rPr>
+              <a:t>Checks the winner hand and the combination value</a:t>
+            </a:r>
+          </a:p>
+          <a:p>
+            <a:r>
+              <a:rPr lang="hu-HU" sz="3200" dirty="0">
+                <a:latin typeface="Helvetica" panose="020B0604020202020204" pitchFamily="34" charset="0"/>
+                <a:cs typeface="Helvetica" panose="020B0604020202020204" pitchFamily="34" charset="0"/>
+              </a:rPr>
+              <a:t>Input lists represent the hands, each number on the right place represents a value or a suit (or a combination check)</a:t>
+            </a:r>
+          </a:p>
+        </p:txBody>
+      </p:sp>
+      <p:sp>
+        <p:nvSpPr>
+          <p:cNvPr id="4" name="Dátum helye 3">
+            <a:extLst>
+              <a:ext uri="{FF2B5EF4-FFF2-40B4-BE49-F238E27FC236}">
+                <a16:creationId xmlns:a16="http://schemas.microsoft.com/office/drawing/2014/main" id="{EEA0F499-9B51-49B5-AB2B-A3D6BC3AC196}"/>
+              </a:ext>
+            </a:extLst>
+          </p:cNvPr>
+          <p:cNvSpPr>
+            <a:spLocks noGrp="1"/>
+          </p:cNvSpPr>
+          <p:nvPr>
+            <p:ph type="dt" sz="half" idx="10"/>
+          </p:nvPr>
+        </p:nvSpPr>
+        <p:spPr/>
+        <p:txBody>
+          <a:bodyPr/>
+          <a:lstStyle/>
+          <a:p>
+            <a:r>
+              <a:rPr lang="en-GB"/>
+              <a:t>27/10/2017</a:t>
+            </a:r>
+          </a:p>
+        </p:txBody>
+      </p:sp>
+      <p:sp>
+        <p:nvSpPr>
+          <p:cNvPr id="5" name="Élőláb helye 4">
+            <a:extLst>
+              <a:ext uri="{FF2B5EF4-FFF2-40B4-BE49-F238E27FC236}">
+                <a16:creationId xmlns:a16="http://schemas.microsoft.com/office/drawing/2014/main" id="{2F219574-FA9E-4B0B-BB27-630EE6176F27}"/>
+              </a:ext>
+            </a:extLst>
+          </p:cNvPr>
+          <p:cNvSpPr>
+            <a:spLocks noGrp="1"/>
+          </p:cNvSpPr>
+          <p:nvPr>
+            <p:ph type="ftr" sz="quarter" idx="11"/>
+          </p:nvPr>
+        </p:nvSpPr>
+        <p:spPr/>
+        <p:txBody>
+          <a:bodyPr/>
+          <a:lstStyle/>
+          <a:p>
+            <a:r>
+              <a:rPr lang="en-GB"/>
+              <a:t>Boldizsár Kiss</a:t>
+            </a:r>
+          </a:p>
+        </p:txBody>
+      </p:sp>
+      <p:sp>
+        <p:nvSpPr>
+          <p:cNvPr id="6" name="Dia számának helye 5">
+            <a:extLst>
+              <a:ext uri="{FF2B5EF4-FFF2-40B4-BE49-F238E27FC236}">
+                <a16:creationId xmlns:a16="http://schemas.microsoft.com/office/drawing/2014/main" id="{93557138-C83E-44C2-B277-AEF051AAF237}"/>
+              </a:ext>
+            </a:extLst>
+          </p:cNvPr>
+          <p:cNvSpPr>
+            <a:spLocks noGrp="1"/>
+          </p:cNvSpPr>
+          <p:nvPr>
+            <p:ph type="sldNum" sz="quarter" idx="12"/>
+          </p:nvPr>
+        </p:nvSpPr>
+        <p:spPr/>
+        <p:txBody>
+          <a:bodyPr/>
+          <a:lstStyle/>
+          <a:p>
+            <a:fld id="{A02811C3-B397-4C0C-B0F8-7534EDBE35B7}" type="slidenum">
+              <a:rPr lang="en-GB" smtClean="0"/>
+              <a:t>8</a:t>
+            </a:fld>
+            <a:endParaRPr lang="en-GB"/>
+          </a:p>
+        </p:txBody>
+      </p:sp>
+      <p:pic>
+        <p:nvPicPr>
+          <p:cNvPr id="7" name="Kép 6">
+            <a:extLst>
+              <a:ext uri="{FF2B5EF4-FFF2-40B4-BE49-F238E27FC236}">
+                <a16:creationId xmlns:a16="http://schemas.microsoft.com/office/drawing/2014/main" id="{9EB3B581-182C-4638-9A26-5165EDAA7C4F}"/>
+              </a:ext>
+            </a:extLst>
+          </p:cNvPr>
+          <p:cNvPicPr>
+            <a:picLocks noChangeAspect="1"/>
+          </p:cNvPicPr>
+          <p:nvPr/>
+        </p:nvPicPr>
+        <p:blipFill>
+          <a:blip r:embed="rId2"/>
+          <a:stretch>
+            <a:fillRect/>
+          </a:stretch>
+        </p:blipFill>
+        <p:spPr>
+          <a:xfrm>
+            <a:off x="5001956" y="1845734"/>
+            <a:ext cx="3364805" cy="4023360"/>
+          </a:xfrm>
+          <a:prstGeom prst="rect">
+            <a:avLst/>
+          </a:prstGeom>
+        </p:spPr>
+      </p:pic>
+    </p:spTree>
+    <p:extLst>
+      <p:ext uri="{BB962C8B-B14F-4D97-AF65-F5344CB8AC3E}">
+        <p14:creationId xmlns:p14="http://schemas.microsoft.com/office/powerpoint/2010/main" val="481650344"/>
+      </p:ext>
+    </p:extLst>
+  </p:cSld>
+  <p:clrMapOvr>
+    <a:masterClrMapping/>
+  </p:clrMapOvr>
+</p:sld>
+</file>
+
+<file path=ppt/slides/slide9.xml><?xml version="1.0" encoding="utf-8"?>
+<p:sld xmlns:a="http://schemas.openxmlformats.org/drawingml/2006/main" xmlns:r="http://schemas.openxmlformats.org/officeDocument/2006/relationships" xmlns:p="http://schemas.openxmlformats.org/presentationml/2006/main">
+  <p:cSld>
+    <p:spTree>
+      <p:nvGrpSpPr>
+        <p:cNvPr id="1" name=""/>
+        <p:cNvGrpSpPr/>
+        <p:nvPr/>
+      </p:nvGrpSpPr>
+      <p:grpSpPr>
+        <a:xfrm>
+          <a:off x="0" y="0"/>
+          <a:ext cx="0" cy="0"/>
+          <a:chOff x="0" y="0"/>
+          <a:chExt cx="0" cy="0"/>
+        </a:xfrm>
+      </p:grpSpPr>
+      <p:sp>
+        <p:nvSpPr>
+          <p:cNvPr id="2" name="Cím 1">
+            <a:extLst>
+              <a:ext uri="{FF2B5EF4-FFF2-40B4-BE49-F238E27FC236}">
+                <a16:creationId xmlns:a16="http://schemas.microsoft.com/office/drawing/2014/main" id="{98FC3461-B22E-4EC5-A4E4-F90EACBEA474}"/>
+              </a:ext>
+            </a:extLst>
+          </p:cNvPr>
+          <p:cNvSpPr>
+            <a:spLocks noGrp="1"/>
+          </p:cNvSpPr>
+          <p:nvPr>
+            <p:ph type="ctrTitle"/>
+          </p:nvPr>
+        </p:nvSpPr>
+        <p:spPr/>
+        <p:txBody>
+          <a:bodyPr>
+            <a:normAutofit/>
+          </a:bodyPr>
+          <a:lstStyle/>
+          <a:p>
+            <a:pPr algn="ctr"/>
+            <a:r>
+              <a:rPr lang="hu-HU" sz="6000" dirty="0">
+                <a:latin typeface="Helvetica" panose="020B0604020202020204" pitchFamily="34" charset="0"/>
+                <a:cs typeface="Helvetica" panose="020B0604020202020204" pitchFamily="34" charset="0"/>
+              </a:rPr>
+              <a:t>Thanks for the attention!</a:t>
+            </a:r>
+            <a:endParaRPr lang="en-GB" sz="6000" dirty="0">
+              <a:latin typeface="Helvetica" panose="020B0604020202020204" pitchFamily="34" charset="0"/>
+              <a:cs typeface="Helvetica" panose="020B0604020202020204" pitchFamily="34" charset="0"/>
+            </a:endParaRPr>
+          </a:p>
+        </p:txBody>
+      </p:sp>
+      <p:sp>
+        <p:nvSpPr>
+          <p:cNvPr id="4" name="Dátum helye 3">
+            <a:extLst>
+              <a:ext uri="{FF2B5EF4-FFF2-40B4-BE49-F238E27FC236}">
+                <a16:creationId xmlns:a16="http://schemas.microsoft.com/office/drawing/2014/main" id="{6C9251F0-10E3-44FE-A02C-E92763A809FF}"/>
+              </a:ext>
+            </a:extLst>
+          </p:cNvPr>
+          <p:cNvSpPr>
+            <a:spLocks noGrp="1"/>
+          </p:cNvSpPr>
+          <p:nvPr>
+            <p:ph type="dt" sz="half" idx="10"/>
+          </p:nvPr>
+        </p:nvSpPr>
+        <p:spPr/>
+        <p:txBody>
+          <a:bodyPr/>
+          <a:lstStyle/>
+          <a:p>
+            <a:r>
+              <a:rPr lang="en-GB"/>
+              <a:t>27/10/2017</a:t>
+            </a:r>
+          </a:p>
+        </p:txBody>
+      </p:sp>
+      <p:sp>
+        <p:nvSpPr>
+          <p:cNvPr id="5" name="Élőláb helye 4">
+            <a:extLst>
+              <a:ext uri="{FF2B5EF4-FFF2-40B4-BE49-F238E27FC236}">
+                <a16:creationId xmlns:a16="http://schemas.microsoft.com/office/drawing/2014/main" id="{EF92CBD6-A22E-42DC-A55C-A0043FC77046}"/>
+              </a:ext>
+            </a:extLst>
+          </p:cNvPr>
+          <p:cNvSpPr>
+            <a:spLocks noGrp="1"/>
+          </p:cNvSpPr>
+          <p:nvPr>
+            <p:ph type="ftr" sz="quarter" idx="11"/>
+          </p:nvPr>
+        </p:nvSpPr>
+        <p:spPr/>
+        <p:txBody>
+          <a:bodyPr/>
+          <a:lstStyle/>
+          <a:p>
+            <a:r>
+              <a:rPr lang="en-GB"/>
+              <a:t>Boldizsár Kiss</a:t>
+            </a:r>
+          </a:p>
+        </p:txBody>
+      </p:sp>
+      <p:sp>
+        <p:nvSpPr>
+          <p:cNvPr id="6" name="Dia számának helye 5">
+            <a:extLst>
+              <a:ext uri="{FF2B5EF4-FFF2-40B4-BE49-F238E27FC236}">
+                <a16:creationId xmlns:a16="http://schemas.microsoft.com/office/drawing/2014/main" id="{E64246EC-9F07-4A04-8461-CB10B687206F}"/>
+              </a:ext>
+            </a:extLst>
+          </p:cNvPr>
+          <p:cNvSpPr>
+            <a:spLocks noGrp="1"/>
+          </p:cNvSpPr>
+          <p:nvPr>
+            <p:ph type="sldNum" sz="quarter" idx="12"/>
+          </p:nvPr>
+        </p:nvSpPr>
+        <p:spPr/>
+        <p:txBody>
+          <a:bodyPr/>
+          <a:lstStyle/>
+          <a:p>
+            <a:fld id="{A02811C3-B397-4C0C-B0F8-7534EDBE35B7}" type="slidenum">
+              <a:rPr lang="en-GB" smtClean="0"/>
+              <a:t>9</a:t>
+            </a:fld>
+            <a:endParaRPr lang="en-GB"/>
+          </a:p>
+        </p:txBody>
+      </p:sp>
+    </p:spTree>
+    <p:extLst>
+      <p:ext uri="{BB962C8B-B14F-4D97-AF65-F5344CB8AC3E}">
+        <p14:creationId xmlns:p14="http://schemas.microsoft.com/office/powerpoint/2010/main" val="832003361"/>
       </p:ext>
     </p:extLst>
   </p:cSld>

</xml_diff>